<commit_message>
Second commit 18092021: a lot was redesgined and done
</commit_message>
<xml_diff>
--- a/Architecture.pptx
+++ b/Architecture.pptx
@@ -198,7 +198,7 @@
           <a:p>
             <a:fld id="{7280E130-9165-4B6E-B1EE-047F50B9586E}" type="datetimeFigureOut">
               <a:rPr lang="pt-BR" smtClean="0"/>
-              <a:t>03/09/2021</a:t>
+              <a:t>18/09/2021</a:t>
             </a:fld>
             <a:endParaRPr lang="pt-BR"/>
           </a:p>
@@ -696,7 +696,7 @@
           <a:p>
             <a:fld id="{419CFA7E-C01D-44E4-AC4F-8CD333780A07}" type="datetimeFigureOut">
               <a:rPr lang="pt-BR" smtClean="0"/>
-              <a:t>03/09/2021</a:t>
+              <a:t>18/09/2021</a:t>
             </a:fld>
             <a:endParaRPr lang="pt-BR"/>
           </a:p>
@@ -894,7 +894,7 @@
           <a:p>
             <a:fld id="{419CFA7E-C01D-44E4-AC4F-8CD333780A07}" type="datetimeFigureOut">
               <a:rPr lang="pt-BR" smtClean="0"/>
-              <a:t>03/09/2021</a:t>
+              <a:t>18/09/2021</a:t>
             </a:fld>
             <a:endParaRPr lang="pt-BR"/>
           </a:p>
@@ -1102,7 +1102,7 @@
           <a:p>
             <a:fld id="{419CFA7E-C01D-44E4-AC4F-8CD333780A07}" type="datetimeFigureOut">
               <a:rPr lang="pt-BR" smtClean="0"/>
-              <a:t>03/09/2021</a:t>
+              <a:t>18/09/2021</a:t>
             </a:fld>
             <a:endParaRPr lang="pt-BR"/>
           </a:p>
@@ -1300,7 +1300,7 @@
           <a:p>
             <a:fld id="{419CFA7E-C01D-44E4-AC4F-8CD333780A07}" type="datetimeFigureOut">
               <a:rPr lang="pt-BR" smtClean="0"/>
-              <a:t>03/09/2021</a:t>
+              <a:t>18/09/2021</a:t>
             </a:fld>
             <a:endParaRPr lang="pt-BR"/>
           </a:p>
@@ -1575,7 +1575,7 @@
           <a:p>
             <a:fld id="{419CFA7E-C01D-44E4-AC4F-8CD333780A07}" type="datetimeFigureOut">
               <a:rPr lang="pt-BR" smtClean="0"/>
-              <a:t>03/09/2021</a:t>
+              <a:t>18/09/2021</a:t>
             </a:fld>
             <a:endParaRPr lang="pt-BR"/>
           </a:p>
@@ -1840,7 +1840,7 @@
           <a:p>
             <a:fld id="{419CFA7E-C01D-44E4-AC4F-8CD333780A07}" type="datetimeFigureOut">
               <a:rPr lang="pt-BR" smtClean="0"/>
-              <a:t>03/09/2021</a:t>
+              <a:t>18/09/2021</a:t>
             </a:fld>
             <a:endParaRPr lang="pt-BR"/>
           </a:p>
@@ -2252,7 +2252,7 @@
           <a:p>
             <a:fld id="{419CFA7E-C01D-44E4-AC4F-8CD333780A07}" type="datetimeFigureOut">
               <a:rPr lang="pt-BR" smtClean="0"/>
-              <a:t>03/09/2021</a:t>
+              <a:t>18/09/2021</a:t>
             </a:fld>
             <a:endParaRPr lang="pt-BR"/>
           </a:p>
@@ -2393,7 +2393,7 @@
           <a:p>
             <a:fld id="{419CFA7E-C01D-44E4-AC4F-8CD333780A07}" type="datetimeFigureOut">
               <a:rPr lang="pt-BR" smtClean="0"/>
-              <a:t>03/09/2021</a:t>
+              <a:t>18/09/2021</a:t>
             </a:fld>
             <a:endParaRPr lang="pt-BR"/>
           </a:p>
@@ -2506,7 +2506,7 @@
           <a:p>
             <a:fld id="{419CFA7E-C01D-44E4-AC4F-8CD333780A07}" type="datetimeFigureOut">
               <a:rPr lang="pt-BR" smtClean="0"/>
-              <a:t>03/09/2021</a:t>
+              <a:t>18/09/2021</a:t>
             </a:fld>
             <a:endParaRPr lang="pt-BR"/>
           </a:p>
@@ -2817,7 +2817,7 @@
           <a:p>
             <a:fld id="{419CFA7E-C01D-44E4-AC4F-8CD333780A07}" type="datetimeFigureOut">
               <a:rPr lang="pt-BR" smtClean="0"/>
-              <a:t>03/09/2021</a:t>
+              <a:t>18/09/2021</a:t>
             </a:fld>
             <a:endParaRPr lang="pt-BR"/>
           </a:p>
@@ -3105,7 +3105,7 @@
           <a:p>
             <a:fld id="{419CFA7E-C01D-44E4-AC4F-8CD333780A07}" type="datetimeFigureOut">
               <a:rPr lang="pt-BR" smtClean="0"/>
-              <a:t>03/09/2021</a:t>
+              <a:t>18/09/2021</a:t>
             </a:fld>
             <a:endParaRPr lang="pt-BR"/>
           </a:p>
@@ -3346,7 +3346,7 @@
           <a:p>
             <a:fld id="{419CFA7E-C01D-44E4-AC4F-8CD333780A07}" type="datetimeFigureOut">
               <a:rPr lang="pt-BR" smtClean="0"/>
-              <a:t>03/09/2021</a:t>
+              <a:t>18/09/2021</a:t>
             </a:fld>
             <a:endParaRPr lang="pt-BR"/>
           </a:p>
@@ -3777,7 +3777,7 @@
         </p:nvSpPr>
         <p:spPr>
           <a:xfrm>
-            <a:off x="4676025" y="4900882"/>
+            <a:off x="4676025" y="4563529"/>
             <a:ext cx="1167618" cy="1350107"/>
           </a:xfrm>
           <a:prstGeom prst="flowChartMagneticDisk">
@@ -3833,7 +3833,7 @@
         </p:nvSpPr>
         <p:spPr>
           <a:xfrm>
-            <a:off x="6951677" y="4217030"/>
+            <a:off x="6951677" y="3879677"/>
             <a:ext cx="4306146" cy="2454179"/>
           </a:xfrm>
           <a:prstGeom prst="rect">
@@ -4165,7 +4165,7 @@
         </p:nvSpPr>
         <p:spPr>
           <a:xfrm>
-            <a:off x="3261560" y="1612546"/>
+            <a:off x="3261560" y="1275193"/>
             <a:ext cx="2299440" cy="646331"/>
           </a:xfrm>
           <a:prstGeom prst="rect">
@@ -4240,7 +4240,7 @@
         </p:nvSpPr>
         <p:spPr>
           <a:xfrm>
-            <a:off x="2281461" y="6121988"/>
+            <a:off x="2281461" y="5784635"/>
             <a:ext cx="2759610" cy="646331"/>
           </a:xfrm>
           <a:prstGeom prst="rect">
@@ -4308,7 +4308,7 @@
         </p:nvSpPr>
         <p:spPr>
           <a:xfrm>
-            <a:off x="172876" y="3019477"/>
+            <a:off x="172876" y="2682124"/>
             <a:ext cx="2759610" cy="646331"/>
           </a:xfrm>
           <a:prstGeom prst="rect">
@@ -4379,7 +4379,7 @@
         </p:nvCxnSpPr>
         <p:spPr>
           <a:xfrm flipH="1" flipV="1">
-            <a:off x="1552681" y="3665808"/>
+            <a:off x="1552681" y="3328455"/>
             <a:ext cx="2108585" cy="2456180"/>
           </a:xfrm>
           <a:prstGeom prst="straightConnector1">
@@ -4421,7 +4421,7 @@
         </p:nvSpPr>
         <p:spPr>
           <a:xfrm>
-            <a:off x="1391519" y="4540196"/>
+            <a:off x="1391519" y="4202843"/>
             <a:ext cx="992579" cy="338554"/>
           </a:xfrm>
           <a:prstGeom prst="rect">
@@ -4471,7 +4471,7 @@
         </p:nvCxnSpPr>
         <p:spPr>
           <a:xfrm flipV="1">
-            <a:off x="1552681" y="1935712"/>
+            <a:off x="1552681" y="1598359"/>
             <a:ext cx="1708879" cy="1083765"/>
           </a:xfrm>
           <a:prstGeom prst="straightConnector1">
@@ -4513,7 +4513,7 @@
         </p:nvSpPr>
         <p:spPr>
           <a:xfrm>
-            <a:off x="1510198" y="2059304"/>
+            <a:off x="1510198" y="1721951"/>
             <a:ext cx="1096775" cy="338554"/>
           </a:xfrm>
           <a:prstGeom prst="rect">
@@ -4557,7 +4557,7 @@
         </p:nvSpPr>
         <p:spPr>
           <a:xfrm>
-            <a:off x="3590635" y="3810513"/>
+            <a:off x="3590635" y="3473160"/>
             <a:ext cx="2299440" cy="646331"/>
           </a:xfrm>
           <a:prstGeom prst="rect">
@@ -4631,7 +4631,7 @@
         </p:nvCxnSpPr>
         <p:spPr>
           <a:xfrm>
-            <a:off x="4411280" y="2258877"/>
+            <a:off x="4411280" y="1921524"/>
             <a:ext cx="329075" cy="1551636"/>
           </a:xfrm>
           <a:prstGeom prst="straightConnector1">
@@ -4673,7 +4673,7 @@
         </p:nvSpPr>
         <p:spPr>
           <a:xfrm>
-            <a:off x="4581289" y="2825628"/>
+            <a:off x="4581289" y="2488275"/>
             <a:ext cx="569388" cy="338554"/>
           </a:xfrm>
           <a:prstGeom prst="rect">
@@ -4721,7 +4721,7 @@
         </p:nvCxnSpPr>
         <p:spPr>
           <a:xfrm>
-            <a:off x="2932486" y="3342643"/>
+            <a:off x="2932486" y="3005290"/>
             <a:ext cx="658149" cy="791036"/>
           </a:xfrm>
           <a:prstGeom prst="straightConnector1">
@@ -4763,7 +4763,7 @@
         </p:nvSpPr>
         <p:spPr>
           <a:xfrm>
-            <a:off x="2986720" y="3271550"/>
+            <a:off x="2986720" y="2934197"/>
             <a:ext cx="1293945" cy="338554"/>
           </a:xfrm>
           <a:prstGeom prst="rect">
@@ -4811,7 +4811,7 @@
         </p:nvCxnSpPr>
         <p:spPr>
           <a:xfrm>
-            <a:off x="4740355" y="4456844"/>
+            <a:off x="4740355" y="4119491"/>
             <a:ext cx="519479" cy="894074"/>
           </a:xfrm>
           <a:prstGeom prst="straightConnector1">
@@ -4856,7 +4856,7 @@
         </p:nvCxnSpPr>
         <p:spPr>
           <a:xfrm flipH="1">
-            <a:off x="5843643" y="5575935"/>
+            <a:off x="5843643" y="5238582"/>
             <a:ext cx="1081893" cy="1"/>
           </a:xfrm>
           <a:prstGeom prst="straightConnector1">
@@ -4898,7 +4898,7 @@
         </p:nvSpPr>
         <p:spPr>
           <a:xfrm>
-            <a:off x="6951677" y="1292757"/>
+            <a:off x="6951677" y="955404"/>
             <a:ext cx="4306146" cy="2454179"/>
           </a:xfrm>
           <a:prstGeom prst="rect">
@@ -4979,7 +4979,7 @@
         </p:nvCxnSpPr>
         <p:spPr>
           <a:xfrm flipV="1">
-            <a:off x="9104750" y="3746936"/>
+            <a:off x="9104750" y="3409583"/>
             <a:ext cx="0" cy="470094"/>
           </a:xfrm>
           <a:prstGeom prst="straightConnector1">
@@ -5024,7 +5024,7 @@
         </p:nvCxnSpPr>
         <p:spPr>
           <a:xfrm rot="10800000" flipV="1">
-            <a:off x="5041071" y="5794954"/>
+            <a:off x="5041071" y="5457601"/>
             <a:ext cx="1910606" cy="650200"/>
           </a:xfrm>
           <a:prstGeom prst="bentConnector3">
@@ -5065,7 +5065,7 @@
         </p:nvSpPr>
         <p:spPr>
           <a:xfrm>
-            <a:off x="5159708" y="6437460"/>
+            <a:off x="5159708" y="6100107"/>
             <a:ext cx="1096775" cy="338554"/>
           </a:xfrm>
           <a:prstGeom prst="rect">
@@ -5106,7 +5106,7 @@
         </p:nvSpPr>
         <p:spPr>
           <a:xfrm>
-            <a:off x="4865983" y="4523088"/>
+            <a:off x="4865983" y="4185735"/>
             <a:ext cx="1003801" cy="338554"/>
           </a:xfrm>
           <a:prstGeom prst="rect">
@@ -5150,7 +5150,7 @@
         </p:nvSpPr>
         <p:spPr>
           <a:xfrm>
-            <a:off x="5827733" y="5209943"/>
+            <a:off x="5827733" y="4872590"/>
             <a:ext cx="1096775" cy="338554"/>
           </a:xfrm>
           <a:prstGeom prst="rect">

</xml_diff>